<commit_message>
modifiche di ordine codice
se qualcosa non va in training torna al precedente, qui il testStudent funziona
</commit_message>
<xml_diff>
--- a/AutoSam(26_05).pptx
+++ b/AutoSam(26_05).pptx
@@ -3727,6 +3727,44 @@
           </a:prstGeom>
         </p:spPr>
       </p:pic>
+      <p:sp>
+        <p:nvSpPr>
+          <p:cNvPr id="4" name="CasellaDiTesto 3">
+            <a:extLst>
+              <a:ext uri="{FF2B5EF4-FFF2-40B4-BE49-F238E27FC236}">
+                <a16:creationId xmlns:a16="http://schemas.microsoft.com/office/drawing/2014/main" id="{FCBA265D-79CA-A372-9C1B-446DC8C072E1}"/>
+              </a:ext>
+            </a:extLst>
+          </p:cNvPr>
+          <p:cNvSpPr txBox="1"/>
+          <p:nvPr/>
+        </p:nvSpPr>
+        <p:spPr>
+          <a:xfrm>
+            <a:off x="330227" y="5730240"/>
+            <a:ext cx="4353533" cy="369332"/>
+          </a:xfrm>
+          <a:prstGeom prst="rect">
+            <a:avLst/>
+          </a:prstGeom>
+          <a:noFill/>
+        </p:spPr>
+        <p:txBody>
+          <a:bodyPr wrap="square" rtlCol="0">
+            <a:spAutoFit/>
+          </a:bodyPr>
+          <a:lstStyle/>
+          <a:p>
+            <a:r>
+              <a:rPr lang="it-IT" dirty="0">
+                <a:hlinkClick r:id="rId3" action="ppaction://hlinkfile"/>
+              </a:rPr>
+              <a:t>RISULTATI AUTOSAM\autoSamKlnmJ.xlsx</a:t>
+            </a:r>
+            <a:endParaRPr lang="it-IT" dirty="0"/>
+          </a:p>
+        </p:txBody>
+      </p:sp>
     </p:spTree>
     <p:extLst>
       <p:ext uri="{BB962C8B-B14F-4D97-AF65-F5344CB8AC3E}">
@@ -4848,7 +4886,7 @@
         <p:spPr>
           <a:xfrm>
             <a:off x="401934" y="1396721"/>
-            <a:ext cx="10138787" cy="3693319"/>
+            <a:ext cx="10138787" cy="4247317"/>
           </a:xfrm>
           <a:prstGeom prst="rect">
             <a:avLst/>
@@ -5072,6 +5110,24 @@
               <a:rPr lang="it-IT" dirty="0"/>
               <a:t>. </a:t>
             </a:r>
+          </a:p>
+          <a:p>
+            <a:pPr marL="285750" indent="-285750">
+              <a:buFontTx/>
+              <a:buChar char="-"/>
+            </a:pPr>
+            <a:r>
+              <a:rPr lang="it-IT" dirty="0"/>
+              <a:t>Tutti i modelli vengono distillati a partire da </a:t>
+            </a:r>
+            <a:r>
+              <a:rPr lang="it-IT" dirty="0" err="1"/>
+              <a:t>decoupledVitBDGfFE</a:t>
+            </a:r>
+            <a:endParaRPr lang="it-IT" dirty="0"/>
+          </a:p>
+          <a:p>
+            <a:endParaRPr lang="it-IT" dirty="0"/>
           </a:p>
           <a:p>
             <a:pPr marL="285750" indent="-285750">

</xml_diff>